<commit_message>
MetaData Capture makes more sense in the context of a workflow
</commit_message>
<xml_diff>
--- a/doc/slides/day2/session4/ProjectOrg.pptx
+++ b/doc/slides/day2/session4/ProjectOrg.pptx
@@ -5,7 +5,7 @@
     <p:sldMasterId id="2147483648" r:id="rId1"/>
   </p:sldMasterIdLst>
   <p:notesMasterIdLst>
-    <p:notesMasterId r:id="rId12"/>
+    <p:notesMasterId r:id="rId9"/>
   </p:notesMasterIdLst>
   <p:sldIdLst>
     <p:sldId id="256" r:id="rId2"/>
@@ -15,9 +15,6 @@
     <p:sldId id="259" r:id="rId6"/>
     <p:sldId id="261" r:id="rId7"/>
     <p:sldId id="262" r:id="rId8"/>
-    <p:sldId id="263" r:id="rId9"/>
-    <p:sldId id="264" r:id="rId10"/>
-    <p:sldId id="265" r:id="rId11"/>
   </p:sldIdLst>
   <p:sldSz cx="9144000" cy="6858000" type="screen4x3"/>
   <p:notesSz cx="6858000" cy="9144000"/>
@@ -545,96 +542,6 @@
               <a:rPr lang="en-US" smtClean="0"/>
               <a:pPr/>
               <a:t>1</a:t>
-            </a:fld>
-            <a:endParaRPr lang="en-US"/>
-          </a:p>
-        </p:txBody>
-      </p:sp>
-    </p:spTree>
-  </p:cSld>
-  <p:clrMapOvr>
-    <a:masterClrMapping/>
-  </p:clrMapOvr>
-</p:notes>
-</file>
-
-<file path=ppt/notesSlides/notesSlide2.xml><?xml version="1.0" encoding="utf-8"?>
-<p:notes xmlns:a="http://schemas.openxmlformats.org/drawingml/2006/main" xmlns:r="http://schemas.openxmlformats.org/officeDocument/2006/relationships" xmlns:mc="http://schemas.openxmlformats.org/markup-compatibility/2006" xmlns:mv="urn:schemas-microsoft-com:mac:vml" xmlns:p="http://schemas.openxmlformats.org/presentationml/2006/main" mc:Ignorable="mv" mc:PreserveAttributes="mv:*">
-  <p:cSld>
-    <p:spTree>
-      <p:nvGrpSpPr>
-        <p:cNvPr id="1" name=""/>
-        <p:cNvGrpSpPr/>
-        <p:nvPr/>
-      </p:nvGrpSpPr>
-      <p:grpSpPr>
-        <a:xfrm>
-          <a:off x="0" y="0"/>
-          <a:ext cx="0" cy="0"/>
-          <a:chOff x="0" y="0"/>
-          <a:chExt cx="0" cy="0"/>
-        </a:xfrm>
-      </p:grpSpPr>
-      <p:sp>
-        <p:nvSpPr>
-          <p:cNvPr id="2" name="Slide Image Placeholder 1"/>
-          <p:cNvSpPr>
-            <a:spLocks noGrp="1" noRot="1" noChangeAspect="1"/>
-          </p:cNvSpPr>
-          <p:nvPr>
-            <p:ph type="sldImg"/>
-          </p:nvPr>
-        </p:nvSpPr>
-        <p:spPr/>
-      </p:sp>
-      <p:sp>
-        <p:nvSpPr>
-          <p:cNvPr id="3" name="Notes Placeholder 2"/>
-          <p:cNvSpPr>
-            <a:spLocks noGrp="1"/>
-          </p:cNvSpPr>
-          <p:nvPr>
-            <p:ph type="body" idx="1"/>
-          </p:nvPr>
-        </p:nvSpPr>
-        <p:spPr/>
-        <p:txBody>
-          <a:bodyPr>
-            <a:normAutofit/>
-          </a:bodyPr>
-          <a:lstStyle/>
-          <a:p>
-            <a:r>
-              <a:rPr lang="en-US" dirty="0" smtClean="0"/>
-              <a:t>Fancy wine term.  Hopefully, you will not ever find yourself in the unfortunate</a:t>
-            </a:r>
-            <a:r>
-              <a:rPr lang="en-US" baseline="0" dirty="0" smtClean="0"/>
-              <a:t> position of being accused of falsifying/doctoring your data.  Using this strategy can make it easier for auditors to clear your name.  Although a committed charlatan can still abuse this system, it is much more difficult.</a:t>
-            </a:r>
-            <a:endParaRPr lang="en-US" dirty="0"/>
-          </a:p>
-        </p:txBody>
-      </p:sp>
-      <p:sp>
-        <p:nvSpPr>
-          <p:cNvPr id="4" name="Slide Number Placeholder 3"/>
-          <p:cNvSpPr>
-            <a:spLocks noGrp="1"/>
-          </p:cNvSpPr>
-          <p:nvPr>
-            <p:ph type="sldNum" sz="quarter" idx="10"/>
-          </p:nvPr>
-        </p:nvSpPr>
-        <p:spPr/>
-        <p:txBody>
-          <a:bodyPr/>
-          <a:lstStyle/>
-          <a:p>
-            <a:fld id="{5C6AEE8C-7E75-B34B-94B0-1167AF240711}" type="slidenum">
-              <a:rPr lang="en-US" smtClean="0"/>
-              <a:pPr/>
-              <a:t>8</a:t>
             </a:fld>
             <a:endParaRPr lang="en-US"/>
           </a:p>
@@ -3661,99 +3568,6 @@
 </p:sld>
 </file>
 
-<file path=ppt/slides/slide10.xml><?xml version="1.0" encoding="utf-8"?>
-<p:sld xmlns:a="http://schemas.openxmlformats.org/drawingml/2006/main" xmlns:r="http://schemas.openxmlformats.org/officeDocument/2006/relationships" xmlns:mc="http://schemas.openxmlformats.org/markup-compatibility/2006" xmlns:mv="urn:schemas-microsoft-com:mac:vml" xmlns:p="http://schemas.openxmlformats.org/presentationml/2006/main" mc:Ignorable="mv" mc:PreserveAttributes="mv:*">
-  <p:cSld>
-    <p:spTree>
-      <p:nvGrpSpPr>
-        <p:cNvPr id="1" name=""/>
-        <p:cNvGrpSpPr/>
-        <p:nvPr/>
-      </p:nvGrpSpPr>
-      <p:grpSpPr>
-        <a:xfrm>
-          <a:off x="0" y="0"/>
-          <a:ext cx="0" cy="0"/>
-          <a:chOff x="0" y="0"/>
-          <a:chExt cx="0" cy="0"/>
-        </a:xfrm>
-      </p:grpSpPr>
-      <p:sp>
-        <p:nvSpPr>
-          <p:cNvPr id="2" name="Title 1"/>
-          <p:cNvSpPr>
-            <a:spLocks noGrp="1"/>
-          </p:cNvSpPr>
-          <p:nvPr>
-            <p:ph type="title"/>
-          </p:nvPr>
-        </p:nvSpPr>
-        <p:spPr/>
-        <p:txBody>
-          <a:bodyPr/>
-          <a:lstStyle/>
-          <a:p>
-            <a:r>
-              <a:rPr lang="en-US" dirty="0" smtClean="0"/>
-              <a:t>Exercise</a:t>
-            </a:r>
-            <a:endParaRPr lang="en-US" dirty="0"/>
-          </a:p>
-        </p:txBody>
-      </p:sp>
-      <p:sp>
-        <p:nvSpPr>
-          <p:cNvPr id="3" name="Content Placeholder 2"/>
-          <p:cNvSpPr>
-            <a:spLocks noGrp="1"/>
-          </p:cNvSpPr>
-          <p:nvPr>
-            <p:ph idx="1"/>
-          </p:nvPr>
-        </p:nvSpPr>
-        <p:spPr/>
-        <p:txBody>
-          <a:bodyPr/>
-          <a:lstStyle/>
-          <a:p>
-            <a:r>
-              <a:rPr lang="en-US" dirty="0" smtClean="0"/>
-              <a:t>modify </a:t>
-            </a:r>
-            <a:r>
-              <a:rPr lang="en-US" dirty="0" err="1" smtClean="0"/>
-              <a:t>src/Plasmodium.sh</a:t>
-            </a:r>
-            <a:r>
-              <a:rPr lang="en-US" dirty="0" smtClean="0"/>
-              <a:t> to capture as much meta data as is available in your local repository, and add/commit its data footprint</a:t>
-            </a:r>
-          </a:p>
-          <a:p>
-            <a:r>
-              <a:rPr lang="en-US" dirty="0" smtClean="0"/>
-              <a:t>write a wrapper script for </a:t>
-            </a:r>
-            <a:r>
-              <a:rPr lang="en-US" dirty="0" err="1" smtClean="0"/>
-              <a:t>src/Plasmodium.sh</a:t>
-            </a:r>
-            <a:r>
-              <a:rPr lang="en-US" dirty="0" smtClean="0"/>
-              <a:t> that captures its STDOUT and STDERR to a log file, and automatically add/commit the STDOUT log</a:t>
-            </a:r>
-            <a:endParaRPr lang="en-US" dirty="0"/>
-          </a:p>
-        </p:txBody>
-      </p:sp>
-    </p:spTree>
-  </p:cSld>
-  <p:clrMapOvr>
-    <a:masterClrMapping/>
-  </p:clrMapOvr>
-</p:sld>
-</file>
-
 <file path=ppt/slides/slide2.xml><?xml version="1.0" encoding="utf-8"?>
 <p:sld xmlns:a="http://schemas.openxmlformats.org/drawingml/2006/main" xmlns:r="http://schemas.openxmlformats.org/officeDocument/2006/relationships" xmlns:mc="http://schemas.openxmlformats.org/markup-compatibility/2006" xmlns:mv="urn:schemas-microsoft-com:mac:vml" xmlns:p="http://schemas.openxmlformats.org/presentationml/2006/main" mc:Ignorable="mv" mc:PreserveAttributes="mv:*">
   <p:cSld>
@@ -4065,37 +3879,13 @@
           <a:p>
             <a:r>
               <a:rPr lang="en-US" dirty="0" smtClean="0"/>
-              <a:t>store all </a:t>
-            </a:r>
+              <a:t>store all of the files relevant to one project under a common root directory</a:t>
+            </a:r>
+          </a:p>
+          <a:p>
             <a:r>
               <a:rPr lang="en-US" dirty="0" smtClean="0"/>
-              <a:t>of the files relevant to one </a:t>
-            </a:r>
-            <a:r>
-              <a:rPr lang="en-US" dirty="0" smtClean="0"/>
-              <a:t>project under </a:t>
-            </a:r>
-            <a:r>
-              <a:rPr lang="en-US" dirty="0" smtClean="0"/>
-              <a:t>a common root </a:t>
-            </a:r>
-            <a:r>
-              <a:rPr lang="en-US" dirty="0" smtClean="0"/>
-              <a:t>directory</a:t>
-            </a:r>
-          </a:p>
-          <a:p>
-            <a:r>
-              <a:rPr lang="en-US" dirty="0" smtClean="0"/>
-              <a:t>logical </a:t>
-            </a:r>
-            <a:r>
-              <a:rPr lang="en-US" dirty="0" smtClean="0"/>
-              <a:t>top-</a:t>
-            </a:r>
-            <a:r>
-              <a:rPr lang="en-US" dirty="0" smtClean="0"/>
-              <a:t>level organization</a:t>
+              <a:t>logical top-level organization</a:t>
             </a:r>
           </a:p>
           <a:p>
@@ -4145,7 +3935,6 @@
               <a:rPr lang="en-US" dirty="0" smtClean="0"/>
               <a:t>logical tertiary organization</a:t>
             </a:r>
-            <a:endParaRPr lang="en-US" dirty="0" smtClean="0"/>
           </a:p>
           <a:p>
             <a:endParaRPr lang="en-US" dirty="0"/>
@@ -4353,416 +4142,6 @@
             <a:endParaRPr lang="en-US" dirty="0" smtClean="0"/>
           </a:p>
           <a:p>
-            <a:endParaRPr lang="en-US" dirty="0"/>
-          </a:p>
-        </p:txBody>
-      </p:sp>
-    </p:spTree>
-  </p:cSld>
-  <p:clrMapOvr>
-    <a:masterClrMapping/>
-  </p:clrMapOvr>
-</p:sld>
-</file>
-
-<file path=ppt/slides/slide8.xml><?xml version="1.0" encoding="utf-8"?>
-<p:sld xmlns:a="http://schemas.openxmlformats.org/drawingml/2006/main" xmlns:r="http://schemas.openxmlformats.org/officeDocument/2006/relationships" xmlns:mc="http://schemas.openxmlformats.org/markup-compatibility/2006" xmlns:mv="urn:schemas-microsoft-com:mac:vml" xmlns:p="http://schemas.openxmlformats.org/presentationml/2006/main" mc:Ignorable="mv" mc:PreserveAttributes="mv:*">
-  <p:cSld>
-    <p:spTree>
-      <p:nvGrpSpPr>
-        <p:cNvPr id="1" name=""/>
-        <p:cNvGrpSpPr/>
-        <p:nvPr/>
-      </p:nvGrpSpPr>
-      <p:grpSpPr>
-        <a:xfrm>
-          <a:off x="0" y="0"/>
-          <a:ext cx="0" cy="0"/>
-          <a:chOff x="0" y="0"/>
-          <a:chExt cx="0" cy="0"/>
-        </a:xfrm>
-      </p:grpSpPr>
-      <p:sp>
-        <p:nvSpPr>
-          <p:cNvPr id="2" name="Title 1"/>
-          <p:cNvSpPr>
-            <a:spLocks noGrp="1"/>
-          </p:cNvSpPr>
-          <p:nvPr>
-            <p:ph type="title"/>
-          </p:nvPr>
-        </p:nvSpPr>
-        <p:spPr/>
-        <p:txBody>
-          <a:bodyPr>
-            <a:normAutofit fontScale="90000"/>
-          </a:bodyPr>
-          <a:lstStyle/>
-          <a:p>
-            <a:r>
-              <a:rPr lang="en-US" dirty="0" smtClean="0"/>
-              <a:t>Capturing and versioning Data and Analysis Meta Data</a:t>
-            </a:r>
-            <a:endParaRPr lang="en-US" dirty="0"/>
-          </a:p>
-        </p:txBody>
-      </p:sp>
-      <p:sp>
-        <p:nvSpPr>
-          <p:cNvPr id="3" name="Content Placeholder 2"/>
-          <p:cNvSpPr>
-            <a:spLocks noGrp="1"/>
-          </p:cNvSpPr>
-          <p:nvPr>
-            <p:ph idx="1"/>
-          </p:nvPr>
-        </p:nvSpPr>
-        <p:spPr/>
-        <p:txBody>
-          <a:bodyPr>
-            <a:normAutofit fontScale="55000" lnSpcReduction="20000"/>
-          </a:bodyPr>
-          <a:lstStyle/>
-          <a:p>
-            <a:pPr>
-              <a:buNone/>
-            </a:pPr>
-            <a:r>
-              <a:rPr lang="en-US" dirty="0" smtClean="0"/>
-              <a:t>Big push is to capture Research Data Provenance</a:t>
-            </a:r>
-          </a:p>
-          <a:p>
-            <a:r>
-              <a:rPr lang="en-US" dirty="0" smtClean="0"/>
-              <a:t>Process of marshalling data from source (internal or external) through analysis pipeline should minimize human interaction/manipulation</a:t>
-            </a:r>
-          </a:p>
-          <a:p>
-            <a:r>
-              <a:rPr lang="en-US" dirty="0" smtClean="0"/>
-              <a:t>Automated pipelines should maximize capture of information about data files, and analysis scripts/programs:</a:t>
-            </a:r>
-          </a:p>
-          <a:p>
-            <a:pPr lvl="1"/>
-            <a:r>
-              <a:rPr lang="en-US" dirty="0" err="1" smtClean="0"/>
-              <a:t>hashsums</a:t>
-            </a:r>
-            <a:r>
-              <a:rPr lang="en-US" dirty="0" smtClean="0"/>
-              <a:t> of data files before and after processing (md5, sha1)</a:t>
-            </a:r>
-          </a:p>
-          <a:p>
-            <a:pPr lvl="1"/>
-            <a:r>
-              <a:rPr lang="en-US" dirty="0" smtClean="0"/>
-              <a:t>paths (which), and versions* of scripts/programs before they are called</a:t>
-            </a:r>
-          </a:p>
-          <a:p>
-            <a:pPr lvl="1"/>
-            <a:r>
-              <a:rPr lang="en-US" dirty="0" err="1" smtClean="0"/>
-              <a:t>hashsums</a:t>
-            </a:r>
-            <a:r>
-              <a:rPr lang="en-US" dirty="0" smtClean="0"/>
-              <a:t> of scripts/programs before they are called (especially if script/program does not supply a version)</a:t>
-            </a:r>
-          </a:p>
-          <a:p>
-            <a:pPr lvl="1"/>
-            <a:r>
-              <a:rPr lang="en-US" dirty="0" smtClean="0"/>
-              <a:t>date/time, </a:t>
-            </a:r>
-            <a:r>
-              <a:rPr lang="en-US" dirty="0" smtClean="0"/>
-              <a:t>start time and end time, and possibly </a:t>
-            </a:r>
-            <a:r>
-              <a:rPr lang="en-US" dirty="0" smtClean="0"/>
-              <a:t>runtime, of each script/program run</a:t>
-            </a:r>
-          </a:p>
-          <a:p>
-            <a:r>
-              <a:rPr lang="en-US" dirty="0" smtClean="0"/>
-              <a:t>Project should include all of this information, from beginning to end, in the RCS so that sharing a repository with the data and scripts ensures that this information is also included</a:t>
-            </a:r>
-          </a:p>
-          <a:p>
-            <a:endParaRPr lang="en-US" dirty="0" smtClean="0"/>
-          </a:p>
-          <a:p>
-            <a:pPr>
-              <a:buNone/>
-            </a:pPr>
-            <a:r>
-              <a:rPr lang="en-US" i="1" dirty="0" smtClean="0"/>
-              <a:t>* many scripts/programs do not print version information.  You should get in the habit of making your own scripts/programs able to print a version to STDOUT and exit with a nonzero exit status upon request</a:t>
-            </a:r>
-            <a:endParaRPr lang="en-US" i="1" dirty="0"/>
-          </a:p>
-        </p:txBody>
-      </p:sp>
-    </p:spTree>
-  </p:cSld>
-  <p:clrMapOvr>
-    <a:masterClrMapping/>
-  </p:clrMapOvr>
-</p:sld>
-</file>
-
-<file path=ppt/slides/slide9.xml><?xml version="1.0" encoding="utf-8"?>
-<p:sld xmlns:a="http://schemas.openxmlformats.org/drawingml/2006/main" xmlns:r="http://schemas.openxmlformats.org/officeDocument/2006/relationships" xmlns:mc="http://schemas.openxmlformats.org/markup-compatibility/2006" xmlns:mv="urn:schemas-microsoft-com:mac:vml" xmlns:p="http://schemas.openxmlformats.org/presentationml/2006/main" mc:Ignorable="mv" mc:PreserveAttributes="mv:*">
-  <p:cSld>
-    <p:spTree>
-      <p:nvGrpSpPr>
-        <p:cNvPr id="1" name=""/>
-        <p:cNvGrpSpPr/>
-        <p:nvPr/>
-      </p:nvGrpSpPr>
-      <p:grpSpPr>
-        <a:xfrm>
-          <a:off x="0" y="0"/>
-          <a:ext cx="0" cy="0"/>
-          <a:chOff x="0" y="0"/>
-          <a:chExt cx="0" cy="0"/>
-        </a:xfrm>
-      </p:grpSpPr>
-      <p:sp>
-        <p:nvSpPr>
-          <p:cNvPr id="2" name="Title 1"/>
-          <p:cNvSpPr>
-            <a:spLocks noGrp="1"/>
-          </p:cNvSpPr>
-          <p:nvPr>
-            <p:ph type="title"/>
-          </p:nvPr>
-        </p:nvSpPr>
-        <p:spPr/>
-        <p:txBody>
-          <a:bodyPr/>
-          <a:lstStyle/>
-          <a:p>
-            <a:r>
-              <a:rPr lang="en-US" dirty="0" smtClean="0"/>
-              <a:t>Modification to Project Structure	</a:t>
-            </a:r>
-            <a:endParaRPr lang="en-US" dirty="0"/>
-          </a:p>
-        </p:txBody>
-      </p:sp>
-      <p:sp>
-        <p:nvSpPr>
-          <p:cNvPr id="3" name="Content Placeholder 2"/>
-          <p:cNvSpPr>
-            <a:spLocks noGrp="1"/>
-          </p:cNvSpPr>
-          <p:nvPr>
-            <p:ph idx="1"/>
-          </p:nvPr>
-        </p:nvSpPr>
-        <p:spPr/>
-        <p:txBody>
-          <a:bodyPr>
-            <a:normAutofit fontScale="55000" lnSpcReduction="20000"/>
-          </a:bodyPr>
-          <a:lstStyle/>
-          <a:p>
-            <a:r>
-              <a:rPr lang="en-US" dirty="0" smtClean="0"/>
-              <a:t>add ‘log’ directory to top level directory (docs, data, </a:t>
-            </a:r>
-            <a:r>
-              <a:rPr lang="en-US" dirty="0" err="1" smtClean="0"/>
-              <a:t>src</a:t>
-            </a:r>
-            <a:r>
-              <a:rPr lang="en-US" dirty="0" smtClean="0"/>
-              <a:t>, bin, results, and now log)</a:t>
-            </a:r>
-          </a:p>
-          <a:p>
-            <a:r>
-              <a:rPr lang="en-US" dirty="0" smtClean="0"/>
-              <a:t>Modify analysis pipeline scripts</a:t>
-            </a:r>
-          </a:p>
-          <a:p>
-            <a:pPr lvl="1"/>
-            <a:r>
-              <a:rPr lang="en-US" dirty="0" smtClean="0"/>
-              <a:t>redirect STDOUT and STDERR to files in log directory named for the script, and the run date-time (or in a date-time subdirectory)</a:t>
-            </a:r>
-          </a:p>
-          <a:p>
-            <a:pPr lvl="1"/>
-            <a:r>
-              <a:rPr lang="en-US" dirty="0" smtClean="0"/>
-              <a:t>print date, start time, end time, and even  total run time to STDOUT log </a:t>
-            </a:r>
-          </a:p>
-          <a:p>
-            <a:pPr lvl="1"/>
-            <a:r>
-              <a:rPr lang="en-US" dirty="0" smtClean="0"/>
-              <a:t>capture </a:t>
-            </a:r>
-            <a:r>
-              <a:rPr lang="en-US" dirty="0" err="1" smtClean="0"/>
-              <a:t>hashsum</a:t>
-            </a:r>
-            <a:r>
-              <a:rPr lang="en-US" dirty="0" smtClean="0"/>
-              <a:t> </a:t>
-            </a:r>
-            <a:r>
-              <a:rPr lang="en-US" dirty="0" smtClean="0"/>
-              <a:t>and </a:t>
-            </a:r>
-            <a:r>
-              <a:rPr lang="en-US" dirty="0" smtClean="0"/>
-              <a:t>version </a:t>
-            </a:r>
-            <a:r>
-              <a:rPr lang="en-US" dirty="0" smtClean="0"/>
-              <a:t>of themselves in STDOUT </a:t>
-            </a:r>
-            <a:r>
-              <a:rPr lang="en-US" dirty="0" smtClean="0"/>
-              <a:t>log</a:t>
-            </a:r>
-            <a:endParaRPr lang="en-US" dirty="0" smtClean="0"/>
-          </a:p>
-          <a:p>
-            <a:pPr lvl="1"/>
-            <a:r>
-              <a:rPr lang="en-US" dirty="0" smtClean="0"/>
-              <a:t>capture </a:t>
-            </a:r>
-            <a:r>
-              <a:rPr lang="en-US" dirty="0" err="1" smtClean="0"/>
-              <a:t>hashsum</a:t>
-            </a:r>
-            <a:r>
-              <a:rPr lang="en-US" dirty="0" smtClean="0"/>
-              <a:t> of data file before* and after* any analysis is run on that data file in STDOUT log</a:t>
-            </a:r>
-          </a:p>
-          <a:p>
-            <a:pPr lvl="1"/>
-            <a:r>
-              <a:rPr lang="en-US" dirty="0" smtClean="0"/>
-              <a:t>capture </a:t>
-            </a:r>
-            <a:r>
-              <a:rPr lang="en-US" dirty="0" err="1" smtClean="0"/>
-              <a:t>hashsums</a:t>
-            </a:r>
-            <a:r>
-              <a:rPr lang="en-US" dirty="0" smtClean="0"/>
-              <a:t> of intermediate data files*, even if the files are to be deleted, in STDOUT log</a:t>
-            </a:r>
-          </a:p>
-          <a:p>
-            <a:pPr lvl="1"/>
-            <a:r>
-              <a:rPr lang="en-US" dirty="0" smtClean="0"/>
-              <a:t>log deletions *of any data files in STDOUT log</a:t>
-            </a:r>
-          </a:p>
-          <a:p>
-            <a:pPr lvl="1"/>
-            <a:r>
-              <a:rPr lang="en-US" dirty="0" smtClean="0"/>
-              <a:t>capture </a:t>
-            </a:r>
-            <a:r>
-              <a:rPr lang="en-US" dirty="0" err="1" smtClean="0"/>
-              <a:t>hashsums</a:t>
-            </a:r>
-            <a:r>
-              <a:rPr lang="en-US" dirty="0" smtClean="0"/>
-              <a:t> and versions of any other script/program executed by the script before executing the script in STDOUT log</a:t>
-            </a:r>
-          </a:p>
-          <a:p>
-            <a:pPr lvl="1"/>
-            <a:r>
-              <a:rPr lang="en-US" dirty="0" smtClean="0"/>
-              <a:t>capture </a:t>
-            </a:r>
-            <a:r>
-              <a:rPr lang="en-US" dirty="0" err="1" smtClean="0"/>
-              <a:t>hashsums</a:t>
-            </a:r>
-            <a:r>
-              <a:rPr lang="en-US" dirty="0" smtClean="0"/>
-              <a:t> of all result files immediately after they are produced in STDOUT log</a:t>
-            </a:r>
-          </a:p>
-          <a:p>
-            <a:pPr lvl="1"/>
-            <a:r>
-              <a:rPr lang="en-US" dirty="0" smtClean="0"/>
-              <a:t>close and </a:t>
-            </a:r>
-            <a:r>
-              <a:rPr lang="en-US" dirty="0" err="1" smtClean="0"/>
-              <a:t>git</a:t>
-            </a:r>
-            <a:r>
-              <a:rPr lang="en-US" dirty="0" smtClean="0"/>
-              <a:t> add/commit all new files, all deleted files, and the STDOUT log file immediately before exiting</a:t>
-            </a:r>
-          </a:p>
-          <a:p>
-            <a:pPr lvl="1"/>
-            <a:r>
-              <a:rPr lang="en-US" dirty="0" smtClean="0"/>
-              <a:t>alternatively, or in addition, use the STDOUT log file as the </a:t>
-            </a:r>
-            <a:r>
-              <a:rPr lang="en-US" dirty="0" err="1" smtClean="0"/>
-              <a:t>git</a:t>
-            </a:r>
-            <a:r>
-              <a:rPr lang="en-US" dirty="0" smtClean="0"/>
-              <a:t> commit message for all new and deleted files (</a:t>
-            </a:r>
-            <a:r>
-              <a:rPr lang="en-US" dirty="0" err="1" smtClean="0"/>
-              <a:t>git</a:t>
-            </a:r>
-            <a:r>
-              <a:rPr lang="en-US" dirty="0" smtClean="0"/>
-              <a:t> commit –</a:t>
-            </a:r>
-            <a:r>
-              <a:rPr lang="en-US" dirty="0" err="1" smtClean="0"/>
-              <a:t>f</a:t>
-            </a:r>
-            <a:r>
-              <a:rPr lang="en-US" dirty="0" smtClean="0"/>
-              <a:t> log/090212/foo.log path/to/files)</a:t>
-            </a:r>
-          </a:p>
-          <a:p>
-            <a:endParaRPr lang="en-US" dirty="0" smtClean="0"/>
-          </a:p>
-          <a:p>
-            <a:pPr>
-              <a:buNone/>
-            </a:pPr>
-            <a:r>
-              <a:rPr lang="en-US" dirty="0" smtClean="0"/>
-              <a:t>* these activities make up the data footprint of an analysis</a:t>
-            </a:r>
             <a:endParaRPr lang="en-US" dirty="0"/>
           </a:p>
         </p:txBody>

</xml_diff>